<commit_message>
updating keynote and transfer function in linealization
</commit_message>
<xml_diff>
--- a/presentacion/Exposición Ica.pptx
+++ b/presentacion/Exposición Ica.pptx
@@ -5,9 +5,19 @@
     <p:sldMasterId id="2147483672" r:id="rId1"/>
   </p:sldMasterIdLst>
   <p:sldIdLst>
-    <p:sldId id="256" r:id="rId2"/>
-    <p:sldId id="257" r:id="rId3"/>
+    <p:sldId id="259" r:id="rId2"/>
+    <p:sldId id="260" r:id="rId3"/>
     <p:sldId id="258" r:id="rId4"/>
+    <p:sldId id="262" r:id="rId5"/>
+    <p:sldId id="263" r:id="rId6"/>
+    <p:sldId id="264" r:id="rId7"/>
+    <p:sldId id="265" r:id="rId8"/>
+    <p:sldId id="266" r:id="rId9"/>
+    <p:sldId id="272" r:id="rId10"/>
+    <p:sldId id="273" r:id="rId11"/>
+    <p:sldId id="274" r:id="rId12"/>
+    <p:sldId id="275" r:id="rId13"/>
+    <p:sldId id="276" r:id="rId14"/>
   </p:sldIdLst>
   <p:sldSz cx="9144000" cy="6858000" type="screen4x3"/>
   <p:notesSz cx="6858000" cy="9144000"/>
@@ -362,7 +372,7 @@
           <a:p>
             <a:fld id="{5ADEF3C9-320D-49C9-B1DC-FD7F4C63C7A7}" type="datetimeFigureOut">
               <a:rPr lang="es-ES" smtClean="0"/>
-              <a:t>07/12/2019</a:t>
+              <a:t>08/12/2019</a:t>
             </a:fld>
             <a:endParaRPr lang="es-ES"/>
           </a:p>
@@ -575,7 +585,7 @@
           <a:p>
             <a:fld id="{5ADEF3C9-320D-49C9-B1DC-FD7F4C63C7A7}" type="datetimeFigureOut">
               <a:rPr lang="es-ES" smtClean="0"/>
-              <a:t>07/12/2019</a:t>
+              <a:t>08/12/2019</a:t>
             </a:fld>
             <a:endParaRPr lang="es-ES"/>
           </a:p>
@@ -842,7 +852,7 @@
           <a:p>
             <a:fld id="{5ADEF3C9-320D-49C9-B1DC-FD7F4C63C7A7}" type="datetimeFigureOut">
               <a:rPr lang="es-ES" smtClean="0"/>
-              <a:t>07/12/2019</a:t>
+              <a:t>08/12/2019</a:t>
             </a:fld>
             <a:endParaRPr lang="es-ES"/>
           </a:p>
@@ -992,7 +1002,7 @@
           <a:p>
             <a:fld id="{5ADEF3C9-320D-49C9-B1DC-FD7F4C63C7A7}" type="datetimeFigureOut">
               <a:rPr lang="es-ES" smtClean="0"/>
-              <a:t>07/12/2019</a:t>
+              <a:t>08/12/2019</a:t>
             </a:fld>
             <a:endParaRPr lang="es-ES"/>
           </a:p>
@@ -1322,7 +1332,7 @@
           <a:p>
             <a:fld id="{5ADEF3C9-320D-49C9-B1DC-FD7F4C63C7A7}" type="datetimeFigureOut">
               <a:rPr lang="es-ES" smtClean="0"/>
-              <a:t>07/12/2019</a:t>
+              <a:t>08/12/2019</a:t>
             </a:fld>
             <a:endParaRPr lang="es-ES"/>
           </a:p>
@@ -1630,7 +1640,7 @@
           <a:p>
             <a:fld id="{5ADEF3C9-320D-49C9-B1DC-FD7F4C63C7A7}" type="datetimeFigureOut">
               <a:rPr lang="es-ES" smtClean="0"/>
-              <a:t>07/12/2019</a:t>
+              <a:t>08/12/2019</a:t>
             </a:fld>
             <a:endParaRPr lang="es-ES"/>
           </a:p>
@@ -2051,7 +2061,7 @@
           <a:p>
             <a:fld id="{5ADEF3C9-320D-49C9-B1DC-FD7F4C63C7A7}" type="datetimeFigureOut">
               <a:rPr lang="es-ES" smtClean="0"/>
-              <a:t>07/12/2019</a:t>
+              <a:t>08/12/2019</a:t>
             </a:fld>
             <a:endParaRPr lang="es-ES"/>
           </a:p>
@@ -2164,7 +2174,7 @@
           <a:p>
             <a:fld id="{5ADEF3C9-320D-49C9-B1DC-FD7F4C63C7A7}" type="datetimeFigureOut">
               <a:rPr lang="es-ES" smtClean="0"/>
-              <a:t>07/12/2019</a:t>
+              <a:t>08/12/2019</a:t>
             </a:fld>
             <a:endParaRPr lang="es-ES"/>
           </a:p>
@@ -2323,7 +2333,7 @@
           <a:p>
             <a:fld id="{5ADEF3C9-320D-49C9-B1DC-FD7F4C63C7A7}" type="datetimeFigureOut">
               <a:rPr lang="es-ES" smtClean="0"/>
-              <a:t>07/12/2019</a:t>
+              <a:t>08/12/2019</a:t>
             </a:fld>
             <a:endParaRPr lang="es-ES"/>
           </a:p>
@@ -2707,7 +2717,7 @@
           <a:p>
             <a:fld id="{5ADEF3C9-320D-49C9-B1DC-FD7F4C63C7A7}" type="datetimeFigureOut">
               <a:rPr lang="es-ES" smtClean="0"/>
-              <a:t>07/12/2019</a:t>
+              <a:t>08/12/2019</a:t>
             </a:fld>
             <a:endParaRPr lang="es-ES"/>
           </a:p>
@@ -3069,7 +3079,7 @@
           <a:p>
             <a:fld id="{5ADEF3C9-320D-49C9-B1DC-FD7F4C63C7A7}" type="datetimeFigureOut">
               <a:rPr lang="es-ES" smtClean="0"/>
-              <a:t>07/12/2019</a:t>
+              <a:t>08/12/2019</a:t>
             </a:fld>
             <a:endParaRPr lang="es-ES"/>
           </a:p>
@@ -3403,7 +3413,7 @@
           <a:p>
             <a:fld id="{5ADEF3C9-320D-49C9-B1DC-FD7F4C63C7A7}" type="datetimeFigureOut">
               <a:rPr lang="es-ES" smtClean="0"/>
-              <a:t>07/12/2019</a:t>
+              <a:t>08/12/2019</a:t>
             </a:fld>
             <a:endParaRPr lang="es-ES"/>
           </a:p>
@@ -3815,54 +3825,86 @@
         </p:nvSpPr>
         <p:spPr>
           <a:xfrm>
-            <a:off x="7069983" y="5229200"/>
-            <a:ext cx="1981200" cy="1512168"/>
+            <a:off x="7069983" y="4653136"/>
+            <a:ext cx="1981200" cy="2088232"/>
           </a:xfrm>
         </p:spPr>
         <p:txBody>
           <a:bodyPr>
-            <a:normAutofit/>
+            <a:normAutofit fontScale="85000" lnSpcReduction="20000"/>
           </a:bodyPr>
           <a:lstStyle/>
           <a:p>
             <a:r>
               <a:rPr lang="es-ES" sz="1600" dirty="0" smtClean="0">
-                <a:latin typeface="Arial Narrow" panose="020B0606020202030204" pitchFamily="34" charset="0"/>
+                <a:latin typeface="+mj-lt"/>
               </a:rPr>
-              <a:t>José Suárez</a:t>
+              <a:t>José Suárez C.I 20199944</a:t>
             </a:r>
           </a:p>
           <a:p>
             <a:r>
               <a:rPr lang="es-ES" sz="1600" dirty="0" smtClean="0">
-                <a:latin typeface="Arial Narrow" panose="020B0606020202030204" pitchFamily="34" charset="0"/>
+                <a:latin typeface="+mj-lt"/>
               </a:rPr>
-              <a:t>Diego Martínez</a:t>
-            </a:r>
+              <a:t>Diego Martínez C.I </a:t>
+            </a:r>
+            <a:r>
+              <a:rPr lang="es-ES" sz="1600" dirty="0">
+                <a:latin typeface="+mj-lt"/>
+              </a:rPr>
+              <a:t>26128457</a:t>
+            </a:r>
+            <a:endParaRPr lang="es-ES" sz="1600" dirty="0" smtClean="0">
+              <a:latin typeface="+mj-lt"/>
+            </a:endParaRPr>
           </a:p>
           <a:p>
             <a:r>
               <a:rPr lang="es-ES" sz="1600" dirty="0" err="1" smtClean="0">
-                <a:latin typeface="Arial Narrow" panose="020B0606020202030204" pitchFamily="34" charset="0"/>
+                <a:latin typeface="+mj-lt"/>
               </a:rPr>
-              <a:t>Ermi</a:t>
+              <a:t>Ermirosa</a:t>
             </a:r>
             <a:r>
               <a:rPr lang="es-ES" sz="1600" dirty="0" smtClean="0">
-                <a:latin typeface="Arial Narrow" panose="020B0606020202030204" pitchFamily="34" charset="0"/>
+                <a:latin typeface="+mj-lt"/>
               </a:rPr>
-              <a:t> Sosa</a:t>
+              <a:t> Santiago C.I 23442726</a:t>
             </a:r>
           </a:p>
           <a:p>
             <a:r>
               <a:rPr lang="es-ES" sz="1600" dirty="0" smtClean="0">
-                <a:latin typeface="Arial Narrow" panose="020B0606020202030204" pitchFamily="34" charset="0"/>
+                <a:latin typeface="+mj-lt"/>
               </a:rPr>
-              <a:t>Alfredo </a:t>
+              <a:t>Alfredo Ferreira C.I </a:t>
+            </a:r>
+            <a:r>
+              <a:rPr lang="es-ES" sz="1600" dirty="0">
+                <a:latin typeface="+mj-lt"/>
+              </a:rPr>
+              <a:t>26765212</a:t>
+            </a:r>
+            <a:endParaRPr lang="es-ES" sz="1600" dirty="0" smtClean="0">
+              <a:latin typeface="+mj-lt"/>
+            </a:endParaRPr>
+          </a:p>
+          <a:p>
+            <a:r>
+              <a:rPr lang="es-ES" sz="1600" dirty="0" err="1" smtClean="0">
+                <a:latin typeface="+mj-lt"/>
+              </a:rPr>
+              <a:t>Elix</a:t>
+            </a:r>
+            <a:r>
+              <a:rPr lang="es-ES" sz="1600" dirty="0" smtClean="0">
+                <a:latin typeface="+mj-lt"/>
+              </a:rPr>
+              <a:t> Vivas C.I 22987085</a:t>
             </a:r>
             <a:endParaRPr lang="es-ES" sz="1600" dirty="0">
-              <a:latin typeface="Arial Narrow" panose="020B0606020202030204" pitchFamily="34" charset="0"/>
+              <a:latin typeface="+mj-lt"/>
             </a:endParaRPr>
           </a:p>
         </p:txBody>
@@ -3879,77 +3921,29 @@
         </p:nvSpPr>
         <p:spPr>
           <a:xfrm>
-            <a:off x="683568" y="2348880"/>
-            <a:ext cx="5472608" cy="1828800"/>
-          </a:xfrm>
-        </p:spPr>
-        <p:txBody>
-          <a:bodyPr/>
-          <a:lstStyle/>
-          <a:p>
-            <a:pPr algn="just"/>
-            <a:r>
-              <a:rPr lang="es-ES" sz="2800" dirty="0" smtClean="0">
+            <a:off x="462563" y="2060848"/>
+            <a:ext cx="6120680" cy="2116832"/>
+          </a:xfrm>
+        </p:spPr>
+        <p:txBody>
+          <a:bodyPr/>
+          <a:lstStyle/>
+          <a:p>
+            <a:pPr algn="ctr"/>
+            <a:r>
+              <a:rPr lang="es-ES" sz="2800" u="sng" dirty="0" smtClean="0">
                 <a:latin typeface="Arial Narrow" panose="020B0606020202030204" pitchFamily="34" charset="0"/>
                 <a:cs typeface="Arial" panose="020B0604020202020204" pitchFamily="34" charset="0"/>
               </a:rPr>
-              <a:t>Funcionamiento </a:t>
-            </a:r>
-            <a:br>
-              <a:rPr lang="es-ES" sz="2800" dirty="0" smtClean="0">
-                <a:latin typeface="Arial Narrow" panose="020B0606020202030204" pitchFamily="34" charset="0"/>
-                <a:cs typeface="Arial" panose="020B0604020202020204" pitchFamily="34" charset="0"/>
-              </a:rPr>
-            </a:br>
-            <a:r>
-              <a:rPr lang="es-ES" sz="2800" dirty="0" smtClean="0">
-                <a:latin typeface="Arial Narrow" panose="020B0606020202030204" pitchFamily="34" charset="0"/>
-                <a:cs typeface="Arial" panose="020B0604020202020204" pitchFamily="34" charset="0"/>
-              </a:rPr>
-              <a:t>de la maquina de vapor watt</a:t>
-            </a:r>
-            <a:endParaRPr lang="es-ES" sz="2800" dirty="0">
+              <a:t>Regulador Centrifugo de watt</a:t>
+            </a:r>
+            <a:endParaRPr lang="es-ES" sz="2800" u="sng" dirty="0">
               <a:latin typeface="Arial Narrow" panose="020B0606020202030204" pitchFamily="34" charset="0"/>
               <a:cs typeface="Arial" panose="020B0604020202020204" pitchFamily="34" charset="0"/>
             </a:endParaRPr>
           </a:p>
         </p:txBody>
       </p:sp>
-      <p:cxnSp>
-        <p:nvCxnSpPr>
-          <p:cNvPr id="5" name="4 Conector recto"/>
-          <p:cNvCxnSpPr/>
-          <p:nvPr/>
-        </p:nvCxnSpPr>
-        <p:spPr>
-          <a:xfrm>
-            <a:off x="611560" y="3789040"/>
-            <a:ext cx="5472608" cy="0"/>
-          </a:xfrm>
-          <a:prstGeom prst="line">
-            <a:avLst/>
-          </a:prstGeom>
-          <a:ln w="38100" cmpd="sng">
-            <a:solidFill>
-              <a:schemeClr val="bg1"/>
-            </a:solidFill>
-          </a:ln>
-        </p:spPr>
-        <p:style>
-          <a:lnRef idx="1">
-            <a:schemeClr val="accent1"/>
-          </a:lnRef>
-          <a:fillRef idx="0">
-            <a:schemeClr val="accent1"/>
-          </a:fillRef>
-          <a:effectRef idx="0">
-            <a:schemeClr val="accent1"/>
-          </a:effectRef>
-          <a:fontRef idx="minor">
-            <a:schemeClr val="tx1"/>
-          </a:fontRef>
-        </p:style>
-      </p:cxnSp>
       <p:pic>
         <p:nvPicPr>
           <p:cNvPr id="1026" name="Picture 2" descr="Resultado de imagen para facultad de ingenieria ula blanco"/>
@@ -4126,7 +4120,458 @@
     </p:spTree>
     <p:extLst>
       <p:ext uri="{BB962C8B-B14F-4D97-AF65-F5344CB8AC3E}">
-        <p14:creationId xmlns:p14="http://schemas.microsoft.com/office/powerpoint/2010/main" val="218428245"/>
+        <p14:creationId xmlns:p14="http://schemas.microsoft.com/office/powerpoint/2010/main" val="3069006545"/>
+      </p:ext>
+    </p:extLst>
+  </p:cSld>
+  <p:clrMapOvr>
+    <a:masterClrMapping/>
+  </p:clrMapOvr>
+  <p:timing>
+    <p:tnLst>
+      <p:par>
+        <p:cTn id="1" dur="indefinite" restart="never" nodeType="tmRoot"/>
+      </p:par>
+    </p:tnLst>
+  </p:timing>
+</p:sld>
+</file>
+
+<file path=ppt/slides/slide10.xml><?xml version="1.0" encoding="utf-8"?>
+<p:sld xmlns:a="http://schemas.openxmlformats.org/drawingml/2006/main" xmlns:r="http://schemas.openxmlformats.org/officeDocument/2006/relationships" xmlns:p="http://schemas.openxmlformats.org/presentationml/2006/main">
+  <p:cSld>
+    <p:spTree>
+      <p:nvGrpSpPr>
+        <p:cNvPr id="1" name=""/>
+        <p:cNvGrpSpPr/>
+        <p:nvPr/>
+      </p:nvGrpSpPr>
+      <p:grpSpPr>
+        <a:xfrm>
+          <a:off x="0" y="0"/>
+          <a:ext cx="0" cy="0"/>
+          <a:chOff x="0" y="0"/>
+          <a:chExt cx="0" cy="0"/>
+        </a:xfrm>
+      </p:grpSpPr>
+      <p:pic>
+        <p:nvPicPr>
+          <p:cNvPr id="8194" name="Picture 2"/>
+          <p:cNvPicPr>
+            <a:picLocks noGrp="1" noChangeAspect="1" noChangeArrowheads="1"/>
+          </p:cNvPicPr>
+          <p:nvPr>
+            <p:ph idx="1"/>
+          </p:nvPr>
+        </p:nvPicPr>
+        <p:blipFill rotWithShape="1">
+          <a:blip r:embed="rId2">
+            <a:extLst>
+              <a:ext uri="{28A0092B-C50C-407E-A947-70E740481C1C}">
+                <a14:useLocalDpi xmlns:a14="http://schemas.microsoft.com/office/drawing/2010/main" val="0"/>
+              </a:ext>
+            </a:extLst>
+          </a:blip>
+          <a:srcRect l="14452" t="15509" r="1844" b="33722"/>
+          <a:stretch/>
+        </p:blipFill>
+        <p:spPr bwMode="auto">
+          <a:xfrm>
+            <a:off x="611560" y="1844824"/>
+            <a:ext cx="8005069" cy="4608512"/>
+          </a:xfrm>
+          <a:prstGeom prst="rect">
+            <a:avLst/>
+          </a:prstGeom>
+          <a:noFill/>
+          <a:ln>
+            <a:noFill/>
+          </a:ln>
+          <a:extLst>
+            <a:ext uri="{909E8E84-426E-40DD-AFC4-6F175D3DCCD1}">
+              <a14:hiddenFill xmlns:a14="http://schemas.microsoft.com/office/drawing/2010/main">
+                <a:solidFill>
+                  <a:schemeClr val="accent1"/>
+                </a:solidFill>
+              </a14:hiddenFill>
+            </a:ext>
+            <a:ext uri="{91240B29-F687-4F45-9708-019B960494DF}">
+              <a14:hiddenLine xmlns:a14="http://schemas.microsoft.com/office/drawing/2010/main" w="9525">
+                <a:solidFill>
+                  <a:schemeClr val="tx1"/>
+                </a:solidFill>
+                <a:miter lim="800000"/>
+                <a:headEnd/>
+                <a:tailEnd/>
+              </a14:hiddenLine>
+            </a:ext>
+          </a:extLst>
+        </p:spPr>
+      </p:pic>
+      <p:sp>
+        <p:nvSpPr>
+          <p:cNvPr id="5" name="2 Título"/>
+          <p:cNvSpPr>
+            <a:spLocks noGrp="1"/>
+          </p:cNvSpPr>
+          <p:nvPr>
+            <p:ph type="title"/>
+          </p:nvPr>
+        </p:nvSpPr>
+        <p:spPr>
+          <a:xfrm>
+            <a:off x="381000" y="355847"/>
+            <a:ext cx="8381260" cy="1054394"/>
+          </a:xfrm>
+        </p:spPr>
+        <p:txBody>
+          <a:bodyPr/>
+          <a:lstStyle/>
+          <a:p>
+            <a:r>
+              <a:rPr lang="es-ES" dirty="0" smtClean="0"/>
+              <a:t>Linealización</a:t>
+            </a:r>
+            <a:endParaRPr lang="es-ES" dirty="0"/>
+          </a:p>
+        </p:txBody>
+      </p:sp>
+    </p:spTree>
+    <p:extLst>
+      <p:ext uri="{BB962C8B-B14F-4D97-AF65-F5344CB8AC3E}">
+        <p14:creationId xmlns:p14="http://schemas.microsoft.com/office/powerpoint/2010/main" val="3533985160"/>
+      </p:ext>
+    </p:extLst>
+  </p:cSld>
+  <p:clrMapOvr>
+    <a:masterClrMapping/>
+  </p:clrMapOvr>
+</p:sld>
+</file>
+
+<file path=ppt/slides/slide11.xml><?xml version="1.0" encoding="utf-8"?>
+<p:sld xmlns:a="http://schemas.openxmlformats.org/drawingml/2006/main" xmlns:r="http://schemas.openxmlformats.org/officeDocument/2006/relationships" xmlns:p="http://schemas.openxmlformats.org/presentationml/2006/main">
+  <p:cSld>
+    <p:spTree>
+      <p:nvGrpSpPr>
+        <p:cNvPr id="1" name=""/>
+        <p:cNvGrpSpPr/>
+        <p:nvPr/>
+      </p:nvGrpSpPr>
+      <p:grpSpPr>
+        <a:xfrm>
+          <a:off x="0" y="0"/>
+          <a:ext cx="0" cy="0"/>
+          <a:chOff x="0" y="0"/>
+          <a:chExt cx="0" cy="0"/>
+        </a:xfrm>
+      </p:grpSpPr>
+      <p:sp>
+        <p:nvSpPr>
+          <p:cNvPr id="3" name="2 Título"/>
+          <p:cNvSpPr>
+            <a:spLocks noGrp="1"/>
+          </p:cNvSpPr>
+          <p:nvPr>
+            <p:ph type="title"/>
+          </p:nvPr>
+        </p:nvSpPr>
+        <p:spPr/>
+        <p:txBody>
+          <a:bodyPr/>
+          <a:lstStyle/>
+          <a:p>
+            <a:r>
+              <a:rPr lang="es-ES" dirty="0" smtClean="0"/>
+              <a:t>Función de transferencia</a:t>
+            </a:r>
+            <a:endParaRPr lang="es-ES" dirty="0"/>
+          </a:p>
+        </p:txBody>
+      </p:sp>
+      <p:pic>
+        <p:nvPicPr>
+          <p:cNvPr id="9219" name="Picture 3"/>
+          <p:cNvPicPr>
+            <a:picLocks noGrp="1" noChangeAspect="1" noChangeArrowheads="1"/>
+          </p:cNvPicPr>
+          <p:nvPr>
+            <p:ph idx="1"/>
+          </p:nvPr>
+        </p:nvPicPr>
+        <p:blipFill>
+          <a:blip r:embed="rId2">
+            <a:extLst>
+              <a:ext uri="{28A0092B-C50C-407E-A947-70E740481C1C}">
+                <a14:useLocalDpi xmlns:a14="http://schemas.microsoft.com/office/drawing/2010/main" val="0"/>
+              </a:ext>
+            </a:extLst>
+          </a:blip>
+          <a:srcRect/>
+          <a:stretch>
+            <a:fillRect/>
+          </a:stretch>
+        </p:blipFill>
+        <p:spPr bwMode="auto">
+          <a:xfrm>
+            <a:off x="565150" y="2764473"/>
+            <a:ext cx="8039100" cy="2316480"/>
+          </a:xfrm>
+          <a:prstGeom prst="rect">
+            <a:avLst/>
+          </a:prstGeom>
+          <a:noFill/>
+          <a:ln>
+            <a:noFill/>
+          </a:ln>
+          <a:extLst>
+            <a:ext uri="{909E8E84-426E-40DD-AFC4-6F175D3DCCD1}">
+              <a14:hiddenFill xmlns:a14="http://schemas.microsoft.com/office/drawing/2010/main">
+                <a:solidFill>
+                  <a:schemeClr val="accent1"/>
+                </a:solidFill>
+              </a14:hiddenFill>
+            </a:ext>
+            <a:ext uri="{91240B29-F687-4F45-9708-019B960494DF}">
+              <a14:hiddenLine xmlns:a14="http://schemas.microsoft.com/office/drawing/2010/main" w="9525">
+                <a:solidFill>
+                  <a:schemeClr val="tx1"/>
+                </a:solidFill>
+                <a:miter lim="800000"/>
+                <a:headEnd/>
+                <a:tailEnd/>
+              </a14:hiddenLine>
+            </a:ext>
+          </a:extLst>
+        </p:spPr>
+      </p:pic>
+    </p:spTree>
+    <p:extLst>
+      <p:ext uri="{BB962C8B-B14F-4D97-AF65-F5344CB8AC3E}">
+        <p14:creationId xmlns:p14="http://schemas.microsoft.com/office/powerpoint/2010/main" val="2794990821"/>
+      </p:ext>
+    </p:extLst>
+  </p:cSld>
+  <p:clrMapOvr>
+    <a:masterClrMapping/>
+  </p:clrMapOvr>
+</p:sld>
+</file>
+
+<file path=ppt/slides/slide12.xml><?xml version="1.0" encoding="utf-8"?>
+<p:sld xmlns:a="http://schemas.openxmlformats.org/drawingml/2006/main" xmlns:r="http://schemas.openxmlformats.org/officeDocument/2006/relationships" xmlns:p="http://schemas.openxmlformats.org/presentationml/2006/main">
+  <p:cSld>
+    <p:spTree>
+      <p:nvGrpSpPr>
+        <p:cNvPr id="1" name=""/>
+        <p:cNvGrpSpPr/>
+        <p:nvPr/>
+      </p:nvGrpSpPr>
+      <p:grpSpPr>
+        <a:xfrm>
+          <a:off x="0" y="0"/>
+          <a:ext cx="0" cy="0"/>
+          <a:chOff x="0" y="0"/>
+          <a:chExt cx="0" cy="0"/>
+        </a:xfrm>
+      </p:grpSpPr>
+      <p:pic>
+        <p:nvPicPr>
+          <p:cNvPr id="10244" name="Picture 4"/>
+          <p:cNvPicPr>
+            <a:picLocks noGrp="1" noChangeAspect="1" noChangeArrowheads="1"/>
+          </p:cNvPicPr>
+          <p:nvPr>
+            <p:ph idx="1"/>
+          </p:nvPr>
+        </p:nvPicPr>
+        <p:blipFill>
+          <a:blip r:embed="rId2">
+            <a:extLst>
+              <a:ext uri="{28A0092B-C50C-407E-A947-70E740481C1C}">
+                <a14:useLocalDpi xmlns:a14="http://schemas.microsoft.com/office/drawing/2010/main" val="0"/>
+              </a:ext>
+            </a:extLst>
+          </a:blip>
+          <a:srcRect/>
+          <a:stretch>
+            <a:fillRect/>
+          </a:stretch>
+        </p:blipFill>
+        <p:spPr bwMode="auto">
+          <a:xfrm>
+            <a:off x="549910" y="3518853"/>
+            <a:ext cx="8069580" cy="807720"/>
+          </a:xfrm>
+          <a:prstGeom prst="rect">
+            <a:avLst/>
+          </a:prstGeom>
+          <a:noFill/>
+          <a:ln>
+            <a:noFill/>
+          </a:ln>
+          <a:extLst>
+            <a:ext uri="{909E8E84-426E-40DD-AFC4-6F175D3DCCD1}">
+              <a14:hiddenFill xmlns:a14="http://schemas.microsoft.com/office/drawing/2010/main">
+                <a:solidFill>
+                  <a:schemeClr val="accent1"/>
+                </a:solidFill>
+              </a14:hiddenFill>
+            </a:ext>
+            <a:ext uri="{91240B29-F687-4F45-9708-019B960494DF}">
+              <a14:hiddenLine xmlns:a14="http://schemas.microsoft.com/office/drawing/2010/main" w="9525">
+                <a:solidFill>
+                  <a:schemeClr val="tx1"/>
+                </a:solidFill>
+                <a:miter lim="800000"/>
+                <a:headEnd/>
+                <a:tailEnd/>
+              </a14:hiddenLine>
+            </a:ext>
+          </a:extLst>
+        </p:spPr>
+      </p:pic>
+      <p:sp>
+        <p:nvSpPr>
+          <p:cNvPr id="9" name="2 Título"/>
+          <p:cNvSpPr>
+            <a:spLocks noGrp="1"/>
+          </p:cNvSpPr>
+          <p:nvPr>
+            <p:ph type="title"/>
+          </p:nvPr>
+        </p:nvSpPr>
+        <p:spPr>
+          <a:xfrm>
+            <a:off x="381000" y="355847"/>
+            <a:ext cx="8381260" cy="1054394"/>
+          </a:xfrm>
+        </p:spPr>
+        <p:txBody>
+          <a:bodyPr/>
+          <a:lstStyle/>
+          <a:p>
+            <a:r>
+              <a:rPr lang="es-ES" dirty="0" smtClean="0"/>
+              <a:t>Función de transferencia</a:t>
+            </a:r>
+            <a:endParaRPr lang="es-ES" dirty="0"/>
+          </a:p>
+        </p:txBody>
+      </p:sp>
+    </p:spTree>
+    <p:extLst>
+      <p:ext uri="{BB962C8B-B14F-4D97-AF65-F5344CB8AC3E}">
+        <p14:creationId xmlns:p14="http://schemas.microsoft.com/office/powerpoint/2010/main" val="2721033346"/>
+      </p:ext>
+    </p:extLst>
+  </p:cSld>
+  <p:clrMapOvr>
+    <a:masterClrMapping/>
+  </p:clrMapOvr>
+</p:sld>
+</file>
+
+<file path=ppt/slides/slide13.xml><?xml version="1.0" encoding="utf-8"?>
+<p:sld xmlns:a="http://schemas.openxmlformats.org/drawingml/2006/main" xmlns:r="http://schemas.openxmlformats.org/officeDocument/2006/relationships" xmlns:p="http://schemas.openxmlformats.org/presentationml/2006/main">
+  <p:cSld>
+    <p:spTree>
+      <p:nvGrpSpPr>
+        <p:cNvPr id="1" name=""/>
+        <p:cNvGrpSpPr/>
+        <p:nvPr/>
+      </p:nvGrpSpPr>
+      <p:grpSpPr>
+        <a:xfrm>
+          <a:off x="0" y="0"/>
+          <a:ext cx="0" cy="0"/>
+          <a:chOff x="0" y="0"/>
+          <a:chExt cx="0" cy="0"/>
+        </a:xfrm>
+      </p:grpSpPr>
+      <p:sp>
+        <p:nvSpPr>
+          <p:cNvPr id="3" name="2 Título"/>
+          <p:cNvSpPr>
+            <a:spLocks noGrp="1"/>
+          </p:cNvSpPr>
+          <p:nvPr>
+            <p:ph type="title"/>
+          </p:nvPr>
+        </p:nvSpPr>
+        <p:spPr/>
+        <p:txBody>
+          <a:bodyPr/>
+          <a:lstStyle/>
+          <a:p>
+            <a:r>
+              <a:rPr lang="es-ES" dirty="0" smtClean="0"/>
+              <a:t>Solución explicita</a:t>
+            </a:r>
+            <a:endParaRPr lang="es-ES" dirty="0"/>
+          </a:p>
+        </p:txBody>
+      </p:sp>
+      <p:pic>
+        <p:nvPicPr>
+          <p:cNvPr id="11267" name="Picture 3"/>
+          <p:cNvPicPr>
+            <a:picLocks noGrp="1" noChangeAspect="1" noChangeArrowheads="1"/>
+          </p:cNvPicPr>
+          <p:nvPr>
+            <p:ph idx="1"/>
+          </p:nvPr>
+        </p:nvPicPr>
+        <p:blipFill>
+          <a:blip r:embed="rId2">
+            <a:extLst>
+              <a:ext uri="{28A0092B-C50C-407E-A947-70E740481C1C}">
+                <a14:useLocalDpi xmlns:a14="http://schemas.microsoft.com/office/drawing/2010/main" val="0"/>
+              </a:ext>
+            </a:extLst>
+          </a:blip>
+          <a:srcRect/>
+          <a:stretch>
+            <a:fillRect/>
+          </a:stretch>
+        </p:blipFill>
+        <p:spPr bwMode="auto">
+          <a:xfrm>
+            <a:off x="546100" y="1960563"/>
+            <a:ext cx="8077200" cy="3924300"/>
+          </a:xfrm>
+          <a:prstGeom prst="rect">
+            <a:avLst/>
+          </a:prstGeom>
+          <a:noFill/>
+          <a:ln>
+            <a:noFill/>
+          </a:ln>
+          <a:extLst>
+            <a:ext uri="{909E8E84-426E-40DD-AFC4-6F175D3DCCD1}">
+              <a14:hiddenFill xmlns:a14="http://schemas.microsoft.com/office/drawing/2010/main">
+                <a:solidFill>
+                  <a:schemeClr val="accent1"/>
+                </a:solidFill>
+              </a14:hiddenFill>
+            </a:ext>
+            <a:ext uri="{91240B29-F687-4F45-9708-019B960494DF}">
+              <a14:hiddenLine xmlns:a14="http://schemas.microsoft.com/office/drawing/2010/main" w="9525">
+                <a:solidFill>
+                  <a:schemeClr val="tx1"/>
+                </a:solidFill>
+                <a:miter lim="800000"/>
+                <a:headEnd/>
+                <a:tailEnd/>
+              </a14:hiddenLine>
+            </a:ext>
+          </a:extLst>
+        </p:spPr>
+      </p:pic>
+    </p:spTree>
+    <p:extLst>
+      <p:ext uri="{BB962C8B-B14F-4D97-AF65-F5344CB8AC3E}">
+        <p14:creationId xmlns:p14="http://schemas.microsoft.com/office/powerpoint/2010/main" val="2758677145"/>
       </p:ext>
     </p:extLst>
   </p:cSld>
@@ -4137,7 +4582,7 @@
 </file>
 
 <file path=ppt/slides/slide2.xml><?xml version="1.0" encoding="utf-8"?>
-<p:sld xmlns:a="http://schemas.openxmlformats.org/drawingml/2006/main" xmlns:r="http://schemas.openxmlformats.org/officeDocument/2006/relationships" xmlns:p="http://schemas.openxmlformats.org/presentationml/2006/main" showMasterSp="0">
+<p:sld xmlns:a="http://schemas.openxmlformats.org/drawingml/2006/main" xmlns:r="http://schemas.openxmlformats.org/officeDocument/2006/relationships" xmlns:p="http://schemas.openxmlformats.org/presentationml/2006/main">
   <p:cSld>
     <p:spTree>
       <p:nvGrpSpPr>
@@ -4221,7 +4666,7 @@
         <p:spPr>
           <a:xfrm>
             <a:off x="395536" y="283839"/>
-            <a:ext cx="8367464" cy="768897"/>
+            <a:ext cx="8496944" cy="1344961"/>
           </a:xfrm>
           <a:solidFill>
             <a:schemeClr val="tx2">
@@ -4236,7 +4681,7 @@
           <a:p>
             <a:r>
               <a:rPr lang="es-ES" dirty="0" smtClean="0"/>
-              <a:t>Maquina de vapor watt</a:t>
+              <a:t>Funcionamiento de la Maquina de vapor de watt</a:t>
             </a:r>
             <a:endParaRPr lang="es-ES" dirty="0"/>
           </a:p>
@@ -4245,13 +4690,20 @@
     </p:spTree>
     <p:extLst>
       <p:ext uri="{BB962C8B-B14F-4D97-AF65-F5344CB8AC3E}">
-        <p14:creationId xmlns:p14="http://schemas.microsoft.com/office/powerpoint/2010/main" val="1659199769"/>
+        <p14:creationId xmlns:p14="http://schemas.microsoft.com/office/powerpoint/2010/main" val="3675450187"/>
       </p:ext>
     </p:extLst>
   </p:cSld>
   <p:clrMapOvr>
     <a:masterClrMapping/>
   </p:clrMapOvr>
+  <p:timing>
+    <p:tnLst>
+      <p:par>
+        <p:cTn id="1" dur="indefinite" restart="never" nodeType="tmRoot"/>
+      </p:par>
+    </p:tnLst>
+  </p:timing>
 </p:sld>
 </file>
 
@@ -4337,6 +4789,771 @@
     <p:extLst>
       <p:ext uri="{BB962C8B-B14F-4D97-AF65-F5344CB8AC3E}">
         <p14:creationId xmlns:p14="http://schemas.microsoft.com/office/powerpoint/2010/main" val="1461716806"/>
+      </p:ext>
+    </p:extLst>
+  </p:cSld>
+  <p:clrMapOvr>
+    <a:masterClrMapping/>
+  </p:clrMapOvr>
+  <p:timing>
+    <p:tnLst>
+      <p:par>
+        <p:cTn id="1" dur="indefinite" restart="never" nodeType="tmRoot"/>
+      </p:par>
+    </p:tnLst>
+  </p:timing>
+</p:sld>
+</file>
+
+<file path=ppt/slides/slide4.xml><?xml version="1.0" encoding="utf-8"?>
+<p:sld xmlns:a="http://schemas.openxmlformats.org/drawingml/2006/main" xmlns:r="http://schemas.openxmlformats.org/officeDocument/2006/relationships" xmlns:p="http://schemas.openxmlformats.org/presentationml/2006/main">
+  <p:cSld>
+    <p:spTree>
+      <p:nvGrpSpPr>
+        <p:cNvPr id="1" name=""/>
+        <p:cNvGrpSpPr/>
+        <p:nvPr/>
+      </p:nvGrpSpPr>
+      <p:grpSpPr>
+        <a:xfrm>
+          <a:off x="0" y="0"/>
+          <a:ext cx="0" cy="0"/>
+          <a:chOff x="0" y="0"/>
+          <a:chExt cx="0" cy="0"/>
+        </a:xfrm>
+      </p:grpSpPr>
+      <p:sp>
+        <p:nvSpPr>
+          <p:cNvPr id="3" name="2 Título"/>
+          <p:cNvSpPr>
+            <a:spLocks noGrp="1"/>
+          </p:cNvSpPr>
+          <p:nvPr>
+            <p:ph type="title"/>
+          </p:nvPr>
+        </p:nvSpPr>
+        <p:spPr/>
+        <p:txBody>
+          <a:bodyPr/>
+          <a:lstStyle/>
+          <a:p>
+            <a:r>
+              <a:rPr lang="es-ES" dirty="0" smtClean="0"/>
+              <a:t>Regulador centrifugo de watt</a:t>
+            </a:r>
+            <a:endParaRPr lang="es-ES" dirty="0"/>
+          </a:p>
+        </p:txBody>
+      </p:sp>
+      <p:pic>
+        <p:nvPicPr>
+          <p:cNvPr id="1026" name="Picture 2"/>
+          <p:cNvPicPr>
+            <a:picLocks noGrp="1" noChangeAspect="1" noChangeArrowheads="1"/>
+          </p:cNvPicPr>
+          <p:nvPr>
+            <p:ph idx="1"/>
+          </p:nvPr>
+        </p:nvPicPr>
+        <p:blipFill rotWithShape="1">
+          <a:blip r:embed="rId2">
+            <a:extLst>
+              <a:ext uri="{28A0092B-C50C-407E-A947-70E740481C1C}">
+                <a14:useLocalDpi xmlns:a14="http://schemas.microsoft.com/office/drawing/2010/main" val="0"/>
+              </a:ext>
+            </a:extLst>
+          </a:blip>
+          <a:srcRect l="11462" t="16505" r="10813" b="8349"/>
+          <a:stretch/>
+        </p:blipFill>
+        <p:spPr bwMode="auto">
+          <a:xfrm>
+            <a:off x="251520" y="1988840"/>
+            <a:ext cx="3456384" cy="4195250"/>
+          </a:xfrm>
+          <a:prstGeom prst="rect">
+            <a:avLst/>
+          </a:prstGeom>
+          <a:noFill/>
+          <a:ln>
+            <a:noFill/>
+          </a:ln>
+          <a:extLst>
+            <a:ext uri="{909E8E84-426E-40DD-AFC4-6F175D3DCCD1}">
+              <a14:hiddenFill xmlns:a14="http://schemas.microsoft.com/office/drawing/2010/main">
+                <a:solidFill>
+                  <a:schemeClr val="accent1"/>
+                </a:solidFill>
+              </a14:hiddenFill>
+            </a:ext>
+            <a:ext uri="{91240B29-F687-4F45-9708-019B960494DF}">
+              <a14:hiddenLine xmlns:a14="http://schemas.microsoft.com/office/drawing/2010/main" w="9525">
+                <a:solidFill>
+                  <a:schemeClr val="tx1"/>
+                </a:solidFill>
+                <a:miter lim="800000"/>
+                <a:headEnd/>
+                <a:tailEnd/>
+              </a14:hiddenLine>
+            </a:ext>
+          </a:extLst>
+        </p:spPr>
+      </p:pic>
+      <p:pic>
+        <p:nvPicPr>
+          <p:cNvPr id="1028" name="Picture 4"/>
+          <p:cNvPicPr>
+            <a:picLocks noChangeAspect="1" noChangeArrowheads="1"/>
+          </p:cNvPicPr>
+          <p:nvPr/>
+        </p:nvPicPr>
+        <p:blipFill rotWithShape="1">
+          <a:blip r:embed="rId3">
+            <a:extLst>
+              <a:ext uri="{28A0092B-C50C-407E-A947-70E740481C1C}">
+                <a14:useLocalDpi xmlns:a14="http://schemas.microsoft.com/office/drawing/2010/main" val="0"/>
+              </a:ext>
+            </a:extLst>
+          </a:blip>
+          <a:srcRect l="14216" t="19938" r="20319" b="17678"/>
+          <a:stretch/>
+        </p:blipFill>
+        <p:spPr bwMode="auto">
+          <a:xfrm>
+            <a:off x="3779912" y="1988840"/>
+            <a:ext cx="5040560" cy="4128442"/>
+          </a:xfrm>
+          <a:prstGeom prst="rect">
+            <a:avLst/>
+          </a:prstGeom>
+          <a:noFill/>
+          <a:ln>
+            <a:noFill/>
+          </a:ln>
+          <a:extLst>
+            <a:ext uri="{909E8E84-426E-40DD-AFC4-6F175D3DCCD1}">
+              <a14:hiddenFill xmlns:a14="http://schemas.microsoft.com/office/drawing/2010/main">
+                <a:solidFill>
+                  <a:schemeClr val="accent1"/>
+                </a:solidFill>
+              </a14:hiddenFill>
+            </a:ext>
+            <a:ext uri="{91240B29-F687-4F45-9708-019B960494DF}">
+              <a14:hiddenLine xmlns:a14="http://schemas.microsoft.com/office/drawing/2010/main" w="9525">
+                <a:solidFill>
+                  <a:schemeClr val="tx1"/>
+                </a:solidFill>
+                <a:miter lim="800000"/>
+                <a:headEnd/>
+                <a:tailEnd/>
+              </a14:hiddenLine>
+            </a:ext>
+          </a:extLst>
+        </p:spPr>
+      </p:pic>
+    </p:spTree>
+    <p:extLst>
+      <p:ext uri="{BB962C8B-B14F-4D97-AF65-F5344CB8AC3E}">
+        <p14:creationId xmlns:p14="http://schemas.microsoft.com/office/powerpoint/2010/main" val="1871755015"/>
+      </p:ext>
+    </p:extLst>
+  </p:cSld>
+  <p:clrMapOvr>
+    <a:masterClrMapping/>
+  </p:clrMapOvr>
+  <p:timing>
+    <p:tnLst>
+      <p:par>
+        <p:cTn id="1" dur="indefinite" restart="never" nodeType="tmRoot"/>
+      </p:par>
+    </p:tnLst>
+  </p:timing>
+</p:sld>
+</file>
+
+<file path=ppt/slides/slide5.xml><?xml version="1.0" encoding="utf-8"?>
+<p:sld xmlns:a="http://schemas.openxmlformats.org/drawingml/2006/main" xmlns:r="http://schemas.openxmlformats.org/officeDocument/2006/relationships" xmlns:p="http://schemas.openxmlformats.org/presentationml/2006/main">
+  <p:cSld>
+    <p:spTree>
+      <p:nvGrpSpPr>
+        <p:cNvPr id="1" name=""/>
+        <p:cNvGrpSpPr/>
+        <p:nvPr/>
+      </p:nvGrpSpPr>
+      <p:grpSpPr>
+        <a:xfrm>
+          <a:off x="0" y="0"/>
+          <a:ext cx="0" cy="0"/>
+          <a:chOff x="0" y="0"/>
+          <a:chExt cx="0" cy="0"/>
+        </a:xfrm>
+      </p:grpSpPr>
+      <p:sp>
+        <p:nvSpPr>
+          <p:cNvPr id="3" name="2 Título"/>
+          <p:cNvSpPr>
+            <a:spLocks noGrp="1"/>
+          </p:cNvSpPr>
+          <p:nvPr>
+            <p:ph type="title"/>
+          </p:nvPr>
+        </p:nvSpPr>
+        <p:spPr/>
+        <p:txBody>
+          <a:bodyPr/>
+          <a:lstStyle/>
+          <a:p>
+            <a:r>
+              <a:rPr lang="es-ES" dirty="0" smtClean="0"/>
+              <a:t>Regulador Centrifugo de watt</a:t>
+            </a:r>
+            <a:endParaRPr lang="es-ES" dirty="0"/>
+          </a:p>
+        </p:txBody>
+      </p:sp>
+      <p:pic>
+        <p:nvPicPr>
+          <p:cNvPr id="2050" name="Picture 2"/>
+          <p:cNvPicPr>
+            <a:picLocks noGrp="1" noChangeAspect="1" noChangeArrowheads="1"/>
+          </p:cNvPicPr>
+          <p:nvPr>
+            <p:ph idx="1"/>
+          </p:nvPr>
+        </p:nvPicPr>
+        <p:blipFill rotWithShape="1">
+          <a:blip r:embed="rId2">
+            <a:extLst>
+              <a:ext uri="{28A0092B-C50C-407E-A947-70E740481C1C}">
+                <a14:useLocalDpi xmlns:a14="http://schemas.microsoft.com/office/drawing/2010/main" val="0"/>
+              </a:ext>
+            </a:extLst>
+          </a:blip>
+          <a:srcRect l="2662" t="27721" r="7835" b="27416"/>
+          <a:stretch/>
+        </p:blipFill>
+        <p:spPr bwMode="auto">
+          <a:xfrm>
+            <a:off x="1201000" y="2132856"/>
+            <a:ext cx="6823657" cy="3960440"/>
+          </a:xfrm>
+          <a:prstGeom prst="rect">
+            <a:avLst/>
+          </a:prstGeom>
+          <a:noFill/>
+          <a:ln>
+            <a:noFill/>
+          </a:ln>
+          <a:extLst>
+            <a:ext uri="{909E8E84-426E-40DD-AFC4-6F175D3DCCD1}">
+              <a14:hiddenFill xmlns:a14="http://schemas.microsoft.com/office/drawing/2010/main">
+                <a:solidFill>
+                  <a:schemeClr val="accent1"/>
+                </a:solidFill>
+              </a14:hiddenFill>
+            </a:ext>
+            <a:ext uri="{91240B29-F687-4F45-9708-019B960494DF}">
+              <a14:hiddenLine xmlns:a14="http://schemas.microsoft.com/office/drawing/2010/main" w="9525">
+                <a:solidFill>
+                  <a:schemeClr val="tx1"/>
+                </a:solidFill>
+                <a:miter lim="800000"/>
+                <a:headEnd/>
+                <a:tailEnd/>
+              </a14:hiddenLine>
+            </a:ext>
+          </a:extLst>
+        </p:spPr>
+      </p:pic>
+    </p:spTree>
+    <p:extLst>
+      <p:ext uri="{BB962C8B-B14F-4D97-AF65-F5344CB8AC3E}">
+        <p14:creationId xmlns:p14="http://schemas.microsoft.com/office/powerpoint/2010/main" val="1108538200"/>
+      </p:ext>
+    </p:extLst>
+  </p:cSld>
+  <p:clrMapOvr>
+    <a:masterClrMapping/>
+  </p:clrMapOvr>
+  <p:timing>
+    <p:tnLst>
+      <p:par>
+        <p:cTn id="1" dur="indefinite" restart="never" nodeType="tmRoot"/>
+      </p:par>
+    </p:tnLst>
+  </p:timing>
+</p:sld>
+</file>
+
+<file path=ppt/slides/slide6.xml><?xml version="1.0" encoding="utf-8"?>
+<p:sld xmlns:a="http://schemas.openxmlformats.org/drawingml/2006/main" xmlns:r="http://schemas.openxmlformats.org/officeDocument/2006/relationships" xmlns:p="http://schemas.openxmlformats.org/presentationml/2006/main">
+  <p:cSld>
+    <p:spTree>
+      <p:nvGrpSpPr>
+        <p:cNvPr id="1" name=""/>
+        <p:cNvGrpSpPr/>
+        <p:nvPr/>
+      </p:nvGrpSpPr>
+      <p:grpSpPr>
+        <a:xfrm>
+          <a:off x="0" y="0"/>
+          <a:ext cx="0" cy="0"/>
+          <a:chOff x="0" y="0"/>
+          <a:chExt cx="0" cy="0"/>
+        </a:xfrm>
+      </p:grpSpPr>
+      <p:sp>
+        <p:nvSpPr>
+          <p:cNvPr id="3" name="2 Título"/>
+          <p:cNvSpPr>
+            <a:spLocks noGrp="1"/>
+          </p:cNvSpPr>
+          <p:nvPr>
+            <p:ph type="title"/>
+          </p:nvPr>
+        </p:nvSpPr>
+        <p:spPr/>
+        <p:txBody>
+          <a:bodyPr/>
+          <a:lstStyle/>
+          <a:p>
+            <a:r>
+              <a:rPr lang="es-ES" dirty="0" smtClean="0"/>
+              <a:t>Sistema de control</a:t>
+            </a:r>
+            <a:endParaRPr lang="es-ES" dirty="0"/>
+          </a:p>
+        </p:txBody>
+      </p:sp>
+      <p:pic>
+        <p:nvPicPr>
+          <p:cNvPr id="4" name="3 Marcador de contenido"/>
+          <p:cNvPicPr>
+            <a:picLocks noGrp="1"/>
+          </p:cNvPicPr>
+          <p:nvPr>
+            <p:ph idx="1"/>
+          </p:nvPr>
+        </p:nvPicPr>
+        <p:blipFill rotWithShape="1">
+          <a:blip r:embed="rId2"/>
+          <a:srcRect t="14839" r="4626" b="14884"/>
+          <a:stretch/>
+        </p:blipFill>
+        <p:spPr bwMode="auto">
+          <a:xfrm>
+            <a:off x="1259632" y="1988840"/>
+            <a:ext cx="6696744" cy="4320480"/>
+          </a:xfrm>
+          <a:prstGeom prst="rect">
+            <a:avLst/>
+          </a:prstGeom>
+          <a:ln>
+            <a:noFill/>
+          </a:ln>
+          <a:extLst>
+            <a:ext uri="{53640926-AAD7-44D8-BBD7-CCE9431645EC}">
+              <a14:shadowObscured xmlns:a14="http://schemas.microsoft.com/office/drawing/2010/main"/>
+            </a:ext>
+          </a:extLst>
+        </p:spPr>
+      </p:pic>
+    </p:spTree>
+    <p:extLst>
+      <p:ext uri="{BB962C8B-B14F-4D97-AF65-F5344CB8AC3E}">
+        <p14:creationId xmlns:p14="http://schemas.microsoft.com/office/powerpoint/2010/main" val="4208427664"/>
+      </p:ext>
+    </p:extLst>
+  </p:cSld>
+  <p:clrMapOvr>
+    <a:masterClrMapping/>
+  </p:clrMapOvr>
+  <p:timing>
+    <p:tnLst>
+      <p:par>
+        <p:cTn id="1" dur="indefinite" restart="never" nodeType="tmRoot"/>
+      </p:par>
+    </p:tnLst>
+  </p:timing>
+</p:sld>
+</file>
+
+<file path=ppt/slides/slide7.xml><?xml version="1.0" encoding="utf-8"?>
+<p:sld xmlns:a="http://schemas.openxmlformats.org/drawingml/2006/main" xmlns:r="http://schemas.openxmlformats.org/officeDocument/2006/relationships" xmlns:p="http://schemas.openxmlformats.org/presentationml/2006/main">
+  <p:cSld>
+    <p:spTree>
+      <p:nvGrpSpPr>
+        <p:cNvPr id="1" name=""/>
+        <p:cNvGrpSpPr/>
+        <p:nvPr/>
+      </p:nvGrpSpPr>
+      <p:grpSpPr>
+        <a:xfrm>
+          <a:off x="0" y="0"/>
+          <a:ext cx="0" cy="0"/>
+          <a:chOff x="0" y="0"/>
+          <a:chExt cx="0" cy="0"/>
+        </a:xfrm>
+      </p:grpSpPr>
+      <p:sp>
+        <p:nvSpPr>
+          <p:cNvPr id="3" name="2 Título"/>
+          <p:cNvSpPr>
+            <a:spLocks noGrp="1"/>
+          </p:cNvSpPr>
+          <p:nvPr>
+            <p:ph type="title"/>
+          </p:nvPr>
+        </p:nvSpPr>
+        <p:spPr/>
+        <p:txBody>
+          <a:bodyPr/>
+          <a:lstStyle/>
+          <a:p>
+            <a:r>
+              <a:rPr lang="es-ES" dirty="0"/>
+              <a:t>Modelo dinámico y ecuaciones diferenciales de movimiento</a:t>
+            </a:r>
+          </a:p>
+        </p:txBody>
+      </p:sp>
+      <p:pic>
+        <p:nvPicPr>
+          <p:cNvPr id="3074" name="Picture 2"/>
+          <p:cNvPicPr>
+            <a:picLocks noGrp="1" noChangeAspect="1" noChangeArrowheads="1"/>
+          </p:cNvPicPr>
+          <p:nvPr>
+            <p:ph idx="1"/>
+          </p:nvPr>
+        </p:nvPicPr>
+        <p:blipFill rotWithShape="1">
+          <a:blip r:embed="rId2">
+            <a:extLst>
+              <a:ext uri="{28A0092B-C50C-407E-A947-70E740481C1C}">
+                <a14:useLocalDpi xmlns:a14="http://schemas.microsoft.com/office/drawing/2010/main" val="0"/>
+              </a:ext>
+            </a:extLst>
+          </a:blip>
+          <a:srcRect l="8271" t="21469" r="12617" b="33722"/>
+          <a:stretch/>
+        </p:blipFill>
+        <p:spPr bwMode="auto">
+          <a:xfrm>
+            <a:off x="467544" y="2276872"/>
+            <a:ext cx="8146241" cy="3691266"/>
+          </a:xfrm>
+          <a:prstGeom prst="rect">
+            <a:avLst/>
+          </a:prstGeom>
+          <a:noFill/>
+          <a:ln>
+            <a:noFill/>
+          </a:ln>
+          <a:extLst>
+            <a:ext uri="{909E8E84-426E-40DD-AFC4-6F175D3DCCD1}">
+              <a14:hiddenFill xmlns:a14="http://schemas.microsoft.com/office/drawing/2010/main">
+                <a:solidFill>
+                  <a:schemeClr val="accent1"/>
+                </a:solidFill>
+              </a14:hiddenFill>
+            </a:ext>
+            <a:ext uri="{91240B29-F687-4F45-9708-019B960494DF}">
+              <a14:hiddenLine xmlns:a14="http://schemas.microsoft.com/office/drawing/2010/main" w="9525">
+                <a:solidFill>
+                  <a:schemeClr val="tx1"/>
+                </a:solidFill>
+                <a:miter lim="800000"/>
+                <a:headEnd/>
+                <a:tailEnd/>
+              </a14:hiddenLine>
+            </a:ext>
+          </a:extLst>
+        </p:spPr>
+      </p:pic>
+    </p:spTree>
+    <p:extLst>
+      <p:ext uri="{BB962C8B-B14F-4D97-AF65-F5344CB8AC3E}">
+        <p14:creationId xmlns:p14="http://schemas.microsoft.com/office/powerpoint/2010/main" val="51869683"/>
+      </p:ext>
+    </p:extLst>
+  </p:cSld>
+  <p:clrMapOvr>
+    <a:masterClrMapping/>
+  </p:clrMapOvr>
+  <p:timing>
+    <p:tnLst>
+      <p:par>
+        <p:cTn id="1" dur="indefinite" restart="never" nodeType="tmRoot"/>
+      </p:par>
+    </p:tnLst>
+  </p:timing>
+</p:sld>
+</file>
+
+<file path=ppt/slides/slide8.xml><?xml version="1.0" encoding="utf-8"?>
+<p:sld xmlns:a="http://schemas.openxmlformats.org/drawingml/2006/main" xmlns:r="http://schemas.openxmlformats.org/officeDocument/2006/relationships" xmlns:p="http://schemas.openxmlformats.org/presentationml/2006/main">
+  <p:cSld>
+    <p:spTree>
+      <p:nvGrpSpPr>
+        <p:cNvPr id="1" name=""/>
+        <p:cNvGrpSpPr/>
+        <p:nvPr/>
+      </p:nvGrpSpPr>
+      <p:grpSpPr>
+        <a:xfrm>
+          <a:off x="0" y="0"/>
+          <a:ext cx="0" cy="0"/>
+          <a:chOff x="0" y="0"/>
+          <a:chExt cx="0" cy="0"/>
+        </a:xfrm>
+      </p:grpSpPr>
+      <p:sp>
+        <p:nvSpPr>
+          <p:cNvPr id="3" name="2 Título"/>
+          <p:cNvSpPr>
+            <a:spLocks noGrp="1"/>
+          </p:cNvSpPr>
+          <p:nvPr>
+            <p:ph type="title"/>
+          </p:nvPr>
+        </p:nvSpPr>
+        <p:spPr/>
+        <p:txBody>
+          <a:bodyPr/>
+          <a:lstStyle/>
+          <a:p>
+            <a:r>
+              <a:rPr lang="es-ES" dirty="0"/>
+              <a:t>Modelo dinámico y ecuaciones diferenciales de movimiento</a:t>
+            </a:r>
+          </a:p>
+        </p:txBody>
+      </p:sp>
+      <p:pic>
+        <p:nvPicPr>
+          <p:cNvPr id="4098" name="Picture 2"/>
+          <p:cNvPicPr>
+            <a:picLocks noGrp="1" noChangeAspect="1" noChangeArrowheads="1"/>
+          </p:cNvPicPr>
+          <p:nvPr>
+            <p:ph idx="1"/>
+          </p:nvPr>
+        </p:nvPicPr>
+        <p:blipFill rotWithShape="1">
+          <a:blip r:embed="rId2">
+            <a:extLst>
+              <a:ext uri="{28A0092B-C50C-407E-A947-70E740481C1C}">
+                <a14:useLocalDpi xmlns:a14="http://schemas.microsoft.com/office/drawing/2010/main" val="0"/>
+              </a:ext>
+            </a:extLst>
+          </a:blip>
+          <a:srcRect l="4916" t="33389" r="19680" b="51655"/>
+          <a:stretch/>
+        </p:blipFill>
+        <p:spPr bwMode="auto">
+          <a:xfrm>
+            <a:off x="467544" y="2060848"/>
+            <a:ext cx="8064896" cy="1440160"/>
+          </a:xfrm>
+          <a:prstGeom prst="rect">
+            <a:avLst/>
+          </a:prstGeom>
+          <a:noFill/>
+          <a:ln>
+            <a:noFill/>
+          </a:ln>
+          <a:extLst>
+            <a:ext uri="{909E8E84-426E-40DD-AFC4-6F175D3DCCD1}">
+              <a14:hiddenFill xmlns:a14="http://schemas.microsoft.com/office/drawing/2010/main">
+                <a:solidFill>
+                  <a:schemeClr val="accent1"/>
+                </a:solidFill>
+              </a14:hiddenFill>
+            </a:ext>
+            <a:ext uri="{91240B29-F687-4F45-9708-019B960494DF}">
+              <a14:hiddenLine xmlns:a14="http://schemas.microsoft.com/office/drawing/2010/main" w="9525">
+                <a:solidFill>
+                  <a:schemeClr val="tx1"/>
+                </a:solidFill>
+                <a:miter lim="800000"/>
+                <a:headEnd/>
+                <a:tailEnd/>
+              </a14:hiddenLine>
+            </a:ext>
+          </a:extLst>
+        </p:spPr>
+      </p:pic>
+      <p:pic>
+        <p:nvPicPr>
+          <p:cNvPr id="4099" name="Picture 3"/>
+          <p:cNvPicPr>
+            <a:picLocks noChangeAspect="1" noChangeArrowheads="1"/>
+          </p:cNvPicPr>
+          <p:nvPr/>
+        </p:nvPicPr>
+        <p:blipFill rotWithShape="1">
+          <a:blip r:embed="rId2">
+            <a:extLst>
+              <a:ext uri="{28A0092B-C50C-407E-A947-70E740481C1C}">
+                <a14:useLocalDpi xmlns:a14="http://schemas.microsoft.com/office/drawing/2010/main" val="0"/>
+              </a:ext>
+            </a:extLst>
+          </a:blip>
+          <a:srcRect l="11359" t="62043" r="26407" b="20325"/>
+          <a:stretch/>
+        </p:blipFill>
+        <p:spPr bwMode="auto">
+          <a:xfrm>
+            <a:off x="683568" y="4005064"/>
+            <a:ext cx="7414174" cy="1800200"/>
+          </a:xfrm>
+          <a:prstGeom prst="rect">
+            <a:avLst/>
+          </a:prstGeom>
+          <a:noFill/>
+          <a:ln>
+            <a:noFill/>
+          </a:ln>
+          <a:extLst>
+            <a:ext uri="{909E8E84-426E-40DD-AFC4-6F175D3DCCD1}">
+              <a14:hiddenFill xmlns:a14="http://schemas.microsoft.com/office/drawing/2010/main">
+                <a:solidFill>
+                  <a:schemeClr val="accent1"/>
+                </a:solidFill>
+              </a14:hiddenFill>
+            </a:ext>
+            <a:ext uri="{91240B29-F687-4F45-9708-019B960494DF}">
+              <a14:hiddenLine xmlns:a14="http://schemas.microsoft.com/office/drawing/2010/main" w="9525">
+                <a:solidFill>
+                  <a:schemeClr val="tx1"/>
+                </a:solidFill>
+                <a:miter lim="800000"/>
+                <a:headEnd/>
+                <a:tailEnd/>
+              </a14:hiddenLine>
+            </a:ext>
+          </a:extLst>
+        </p:spPr>
+      </p:pic>
+    </p:spTree>
+    <p:extLst>
+      <p:ext uri="{BB962C8B-B14F-4D97-AF65-F5344CB8AC3E}">
+        <p14:creationId xmlns:p14="http://schemas.microsoft.com/office/powerpoint/2010/main" val="2903005443"/>
+      </p:ext>
+    </p:extLst>
+  </p:cSld>
+  <p:clrMapOvr>
+    <a:masterClrMapping/>
+  </p:clrMapOvr>
+  <p:timing>
+    <p:tnLst>
+      <p:par>
+        <p:cTn id="1" dur="indefinite" restart="never" nodeType="tmRoot"/>
+      </p:par>
+    </p:tnLst>
+  </p:timing>
+</p:sld>
+</file>
+
+<file path=ppt/slides/slide9.xml><?xml version="1.0" encoding="utf-8"?>
+<p:sld xmlns:a="http://schemas.openxmlformats.org/drawingml/2006/main" xmlns:r="http://schemas.openxmlformats.org/officeDocument/2006/relationships" xmlns:p="http://schemas.openxmlformats.org/presentationml/2006/main">
+  <p:cSld>
+    <p:spTree>
+      <p:nvGrpSpPr>
+        <p:cNvPr id="1" name=""/>
+        <p:cNvGrpSpPr/>
+        <p:nvPr/>
+      </p:nvGrpSpPr>
+      <p:grpSpPr>
+        <a:xfrm>
+          <a:off x="0" y="0"/>
+          <a:ext cx="0" cy="0"/>
+          <a:chOff x="0" y="0"/>
+          <a:chExt cx="0" cy="0"/>
+        </a:xfrm>
+      </p:grpSpPr>
+      <p:sp>
+        <p:nvSpPr>
+          <p:cNvPr id="3" name="2 Título"/>
+          <p:cNvSpPr>
+            <a:spLocks noGrp="1"/>
+          </p:cNvSpPr>
+          <p:nvPr>
+            <p:ph type="title"/>
+          </p:nvPr>
+        </p:nvSpPr>
+        <p:spPr/>
+        <p:txBody>
+          <a:bodyPr/>
+          <a:lstStyle/>
+          <a:p>
+            <a:r>
+              <a:rPr lang="es-ES" dirty="0" smtClean="0"/>
+              <a:t>punto de equilibrio</a:t>
+            </a:r>
+            <a:endParaRPr lang="es-ES" dirty="0"/>
+          </a:p>
+        </p:txBody>
+      </p:sp>
+      <p:pic>
+        <p:nvPicPr>
+          <p:cNvPr id="7170" name="Picture 2"/>
+          <p:cNvPicPr>
+            <a:picLocks noGrp="1" noChangeAspect="1" noChangeArrowheads="1"/>
+          </p:cNvPicPr>
+          <p:nvPr>
+            <p:ph idx="1"/>
+          </p:nvPr>
+        </p:nvPicPr>
+        <p:blipFill rotWithShape="1">
+          <a:blip r:embed="rId2">
+            <a:extLst>
+              <a:ext uri="{28A0092B-C50C-407E-A947-70E740481C1C}">
+                <a14:useLocalDpi xmlns:a14="http://schemas.microsoft.com/office/drawing/2010/main" val="0"/>
+              </a:ext>
+            </a:extLst>
+          </a:blip>
+          <a:srcRect l="2091" t="72459" r="7318" b="18049"/>
+          <a:stretch/>
+        </p:blipFill>
+        <p:spPr bwMode="auto">
+          <a:xfrm>
+            <a:off x="611560" y="2996952"/>
+            <a:ext cx="8084177" cy="677622"/>
+          </a:xfrm>
+          <a:prstGeom prst="rect">
+            <a:avLst/>
+          </a:prstGeom>
+          <a:noFill/>
+          <a:ln>
+            <a:noFill/>
+          </a:ln>
+          <a:extLst>
+            <a:ext uri="{909E8E84-426E-40DD-AFC4-6F175D3DCCD1}">
+              <a14:hiddenFill xmlns:a14="http://schemas.microsoft.com/office/drawing/2010/main">
+                <a:solidFill>
+                  <a:schemeClr val="accent1"/>
+                </a:solidFill>
+              </a14:hiddenFill>
+            </a:ext>
+            <a:ext uri="{91240B29-F687-4F45-9708-019B960494DF}">
+              <a14:hiddenLine xmlns:a14="http://schemas.microsoft.com/office/drawing/2010/main" w="9525">
+                <a:solidFill>
+                  <a:schemeClr val="tx1"/>
+                </a:solidFill>
+                <a:miter lim="800000"/>
+                <a:headEnd/>
+                <a:tailEnd/>
+              </a14:hiddenLine>
+            </a:ext>
+          </a:extLst>
+        </p:spPr>
+      </p:pic>
+    </p:spTree>
+    <p:extLst>
+      <p:ext uri="{BB962C8B-B14F-4D97-AF65-F5344CB8AC3E}">
+        <p14:creationId xmlns:p14="http://schemas.microsoft.com/office/powerpoint/2010/main" val="1015430491"/>
       </p:ext>
     </p:extLst>
   </p:cSld>

</xml_diff>